<commit_message>
ordeno carpeta de teroias
</commit_message>
<xml_diff>
--- a/Teorias/clase 7_1 - Optimización de Consultas.pptx
+++ b/Teorias/clase 7_1 - Optimización de Consultas.pptx
@@ -10424,31 +10424,7 @@
             <a:rPr lang="en-US" baseline="-25000" dirty="0">
               <a:sym typeface="Symbol" pitchFamily="18" charset="2"/>
             </a:rPr>
-            <a:t>^ </a:t>
-          </a:r>
-          <a:r>
-            <a:rPr lang="en-US" baseline="-25000" dirty="0" err="1">
-              <a:sym typeface="Symbol" pitchFamily="18" charset="2"/>
-            </a:rPr>
-            <a:t>ECivil</a:t>
-          </a:r>
-          <a:r>
-            <a:rPr lang="en-US" baseline="-25000" dirty="0">
-              <a:sym typeface="Symbol" pitchFamily="18" charset="2"/>
-            </a:rPr>
-            <a:t>=‘</a:t>
-          </a:r>
-          <a:r>
-            <a:rPr lang="en-US" baseline="-25000" dirty="0" err="1">
-              <a:sym typeface="Symbol" pitchFamily="18" charset="2"/>
-            </a:rPr>
-            <a:t>Soltero</a:t>
-          </a:r>
-          <a:r>
-            <a:rPr lang="en-US" baseline="-25000" dirty="0">
-              <a:sym typeface="Symbol" pitchFamily="18" charset="2"/>
-            </a:rPr>
-            <a:t>’ </a:t>
+            <a:t>^ ECivil=‘Soltero’ </a:t>
           </a:r>
           <a:r>
             <a:rPr lang="en-US" dirty="0">
@@ -10575,16 +10551,10 @@
             <a:t></a:t>
           </a:r>
           <a:r>
-            <a:rPr lang="en-US" baseline="-25000" dirty="0" err="1">
-              <a:sym typeface="Symbol" pitchFamily="18" charset="2"/>
-            </a:rPr>
-            <a:t>Genero</a:t>
-          </a:r>
-          <a:r>
             <a:rPr lang="en-US" baseline="-25000" dirty="0">
               <a:sym typeface="Symbol" pitchFamily="18" charset="2"/>
             </a:rPr>
-            <a:t>=‘M’(</a:t>
+            <a:t>Genero=‘M’(</a:t>
           </a:r>
           <a:r>
             <a:rPr lang="es-AR" dirty="0">
@@ -10596,31 +10566,7 @@
             <a:rPr lang="en-US" baseline="-25000" dirty="0">
               <a:sym typeface="Symbol" pitchFamily="18" charset="2"/>
             </a:rPr>
-            <a:t> </a:t>
-          </a:r>
-          <a:r>
-            <a:rPr lang="en-US" baseline="-25000" dirty="0" err="1">
-              <a:sym typeface="Symbol" pitchFamily="18" charset="2"/>
-            </a:rPr>
-            <a:t>ECivil</a:t>
-          </a:r>
-          <a:r>
-            <a:rPr lang="en-US" baseline="-25000" dirty="0">
-              <a:sym typeface="Symbol" pitchFamily="18" charset="2"/>
-            </a:rPr>
-            <a:t>=‘</a:t>
-          </a:r>
-          <a:r>
-            <a:rPr lang="en-US" baseline="-25000" dirty="0" err="1">
-              <a:sym typeface="Symbol" pitchFamily="18" charset="2"/>
-            </a:rPr>
-            <a:t>Soltero</a:t>
-          </a:r>
-          <a:r>
-            <a:rPr lang="en-US" baseline="-25000" dirty="0">
-              <a:sym typeface="Symbol" pitchFamily="18" charset="2"/>
-            </a:rPr>
-            <a:t>’ </a:t>
+            <a:t> ECivil=‘Soltero’ </a:t>
           </a:r>
           <a:r>
             <a:rPr lang="en-US" dirty="0">
@@ -10908,28 +10854,10 @@
             <a:t></a:t>
           </a:r>
           <a:r>
-            <a:rPr lang="en-US" baseline="-25000" dirty="0" err="1">
-              <a:sym typeface="Symbol" pitchFamily="18" charset="2"/>
-            </a:rPr>
-            <a:t>ECivil</a:t>
-          </a:r>
-          <a:r>
             <a:rPr lang="en-US" baseline="-25000" dirty="0">
               <a:sym typeface="Symbol" pitchFamily="18" charset="2"/>
             </a:rPr>
-            <a:t>=‘</a:t>
-          </a:r>
-          <a:r>
-            <a:rPr lang="en-US" baseline="-25000" dirty="0" err="1">
-              <a:sym typeface="Symbol" pitchFamily="18" charset="2"/>
-            </a:rPr>
-            <a:t>Soltero</a:t>
-          </a:r>
-          <a:r>
-            <a:rPr lang="en-US" baseline="-25000" dirty="0">
-              <a:sym typeface="Symbol" pitchFamily="18" charset="2"/>
-            </a:rPr>
-            <a:t>’ (</a:t>
+            <a:t>ECivil=‘Soltero’ (</a:t>
           </a:r>
           <a:r>
             <a:rPr lang="es-AR" dirty="0">
@@ -10938,16 +10866,10 @@
             <a:t></a:t>
           </a:r>
           <a:r>
-            <a:rPr lang="en-US" baseline="-25000" dirty="0" err="1">
-              <a:sym typeface="Symbol" pitchFamily="18" charset="2"/>
-            </a:rPr>
-            <a:t>Genero</a:t>
-          </a:r>
-          <a:r>
             <a:rPr lang="en-US" baseline="-25000" dirty="0">
               <a:sym typeface="Symbol" pitchFamily="18" charset="2"/>
             </a:rPr>
-            <a:t>=‘M’ </a:t>
+            <a:t>Genero=‘M’ </a:t>
           </a:r>
           <a:r>
             <a:rPr lang="en-US" dirty="0">
@@ -14982,31 +14904,7 @@
             <a:rPr lang="en-US" sz="2200" kern="1200" baseline="-25000" dirty="0">
               <a:sym typeface="Symbol" pitchFamily="18" charset="2"/>
             </a:rPr>
-            <a:t>^ </a:t>
-          </a:r>
-          <a:r>
-            <a:rPr lang="en-US" sz="2200" kern="1200" baseline="-25000" dirty="0" err="1">
-              <a:sym typeface="Symbol" pitchFamily="18" charset="2"/>
-            </a:rPr>
-            <a:t>ECivil</a:t>
-          </a:r>
-          <a:r>
-            <a:rPr lang="en-US" sz="2200" kern="1200" baseline="-25000" dirty="0">
-              <a:sym typeface="Symbol" pitchFamily="18" charset="2"/>
-            </a:rPr>
-            <a:t>=‘</a:t>
-          </a:r>
-          <a:r>
-            <a:rPr lang="en-US" sz="2200" kern="1200" baseline="-25000" dirty="0" err="1">
-              <a:sym typeface="Symbol" pitchFamily="18" charset="2"/>
-            </a:rPr>
-            <a:t>Soltero</a:t>
-          </a:r>
-          <a:r>
-            <a:rPr lang="en-US" sz="2200" kern="1200" baseline="-25000" dirty="0">
-              <a:sym typeface="Symbol" pitchFamily="18" charset="2"/>
-            </a:rPr>
-            <a:t>’ </a:t>
+            <a:t>^ ECivil=‘Soltero’ </a:t>
           </a:r>
           <a:r>
             <a:rPr lang="en-US" sz="2200" kern="1200" dirty="0">
@@ -15097,16 +14995,10 @@
             <a:t></a:t>
           </a:r>
           <a:r>
-            <a:rPr lang="en-US" sz="2200" kern="1200" baseline="-25000" dirty="0" err="1">
-              <a:sym typeface="Symbol" pitchFamily="18" charset="2"/>
-            </a:rPr>
-            <a:t>Genero</a:t>
-          </a:r>
-          <a:r>
             <a:rPr lang="en-US" sz="2200" kern="1200" baseline="-25000" dirty="0">
               <a:sym typeface="Symbol" pitchFamily="18" charset="2"/>
             </a:rPr>
-            <a:t>=‘M’(</a:t>
+            <a:t>Genero=‘M’(</a:t>
           </a:r>
           <a:r>
             <a:rPr lang="es-AR" sz="2200" kern="1200" dirty="0">
@@ -15118,31 +15010,7 @@
             <a:rPr lang="en-US" sz="2200" kern="1200" baseline="-25000" dirty="0">
               <a:sym typeface="Symbol" pitchFamily="18" charset="2"/>
             </a:rPr>
-            <a:t> </a:t>
-          </a:r>
-          <a:r>
-            <a:rPr lang="en-US" sz="2200" kern="1200" baseline="-25000" dirty="0" err="1">
-              <a:sym typeface="Symbol" pitchFamily="18" charset="2"/>
-            </a:rPr>
-            <a:t>ECivil</a:t>
-          </a:r>
-          <a:r>
-            <a:rPr lang="en-US" sz="2200" kern="1200" baseline="-25000" dirty="0">
-              <a:sym typeface="Symbol" pitchFamily="18" charset="2"/>
-            </a:rPr>
-            <a:t>=‘</a:t>
-          </a:r>
-          <a:r>
-            <a:rPr lang="en-US" sz="2200" kern="1200" baseline="-25000" dirty="0" err="1">
-              <a:sym typeface="Symbol" pitchFamily="18" charset="2"/>
-            </a:rPr>
-            <a:t>Soltero</a:t>
-          </a:r>
-          <a:r>
-            <a:rPr lang="en-US" sz="2200" kern="1200" baseline="-25000" dirty="0">
-              <a:sym typeface="Symbol" pitchFamily="18" charset="2"/>
-            </a:rPr>
-            <a:t>’ </a:t>
+            <a:t> ECivil=‘Soltero’ </a:t>
           </a:r>
           <a:r>
             <a:rPr lang="en-US" sz="2200" kern="1200" dirty="0">
@@ -15245,28 +15113,10 @@
             <a:t></a:t>
           </a:r>
           <a:r>
-            <a:rPr lang="en-US" sz="2200" kern="1200" baseline="-25000" dirty="0" err="1">
-              <a:sym typeface="Symbol" pitchFamily="18" charset="2"/>
-            </a:rPr>
-            <a:t>ECivil</a:t>
-          </a:r>
-          <a:r>
             <a:rPr lang="en-US" sz="2200" kern="1200" baseline="-25000" dirty="0">
               <a:sym typeface="Symbol" pitchFamily="18" charset="2"/>
             </a:rPr>
-            <a:t>=‘</a:t>
-          </a:r>
-          <a:r>
-            <a:rPr lang="en-US" sz="2200" kern="1200" baseline="-25000" dirty="0" err="1">
-              <a:sym typeface="Symbol" pitchFamily="18" charset="2"/>
-            </a:rPr>
-            <a:t>Soltero</a:t>
-          </a:r>
-          <a:r>
-            <a:rPr lang="en-US" sz="2200" kern="1200" baseline="-25000" dirty="0">
-              <a:sym typeface="Symbol" pitchFamily="18" charset="2"/>
-            </a:rPr>
-            <a:t>’ (</a:t>
+            <a:t>ECivil=‘Soltero’ (</a:t>
           </a:r>
           <a:r>
             <a:rPr lang="es-AR" sz="2200" kern="1200" dirty="0">
@@ -15275,16 +15125,10 @@
             <a:t></a:t>
           </a:r>
           <a:r>
-            <a:rPr lang="en-US" sz="2200" kern="1200" baseline="-25000" dirty="0" err="1">
-              <a:sym typeface="Symbol" pitchFamily="18" charset="2"/>
-            </a:rPr>
-            <a:t>Genero</a:t>
-          </a:r>
-          <a:r>
             <a:rPr lang="en-US" sz="2200" kern="1200" baseline="-25000" dirty="0">
               <a:sym typeface="Symbol" pitchFamily="18" charset="2"/>
             </a:rPr>
-            <a:t>=‘M’ </a:t>
+            <a:t>Genero=‘M’ </a:t>
           </a:r>
           <a:r>
             <a:rPr lang="en-US" sz="2200" kern="1200" dirty="0">

</xml_diff>